<commit_message>
updated slidedecks and md files
</commit_message>
<xml_diff>
--- a/module-1/01-02 What is REST/01-02 What is REST.pptx
+++ b/module-1/01-02 What is REST/01-02 What is REST.pptx
@@ -2,7 +2,7 @@
 <file path=ppt/presentation.xml><?xml version="1.0" encoding="utf-8"?>
 <p:presentation xmlns:a="http://schemas.openxmlformats.org/drawingml/2006/main" xmlns:r="http://schemas.openxmlformats.org/officeDocument/2006/relationships" xmlns:p="http://schemas.openxmlformats.org/presentationml/2006/main" saveSubsetFonts="1">
   <p:sldMasterIdLst>
-    <p:sldMasterId id="2147483672" r:id="rId1"/>
+    <p:sldMasterId id="2147483684" r:id="rId1"/>
   </p:sldMasterIdLst>
   <p:sldIdLst>
     <p:sldId id="257" r:id="rId2"/>
@@ -105,6 +105,11 @@
       </a:defRPr>
     </a:lvl9pPr>
   </p:defaultTextStyle>
+  <p:extLst>
+    <p:ext uri="{EFAFB233-063F-42B5-8137-9DF3F51BA10A}">
+      <p15:sldGuideLst xmlns:p15="http://schemas.microsoft.com/office/powerpoint/2012/main"/>
+    </p:ext>
+  </p:extLst>
 </p:presentation>
 </file>
 
@@ -140,7 +145,9 @@
             <a:avLst/>
           </a:prstGeom>
           <a:solidFill>
-            <a:schemeClr val="accent2"/>
+            <a:schemeClr val="accent1">
+              <a:lumMod val="75000"/>
+            </a:schemeClr>
           </a:solidFill>
           <a:ln>
             <a:noFill/>
@@ -334,7 +341,7 @@
           <a:p>
             <a:fld id="{955B8CAA-8DD7-4827-A7D8-CBC1AE125B0A}" type="datetimeFigureOut">
               <a:rPr lang="en-US" smtClean="0"/>
-              <a:t>8/30/2021</a:t>
+              <a:t>9/14/2021</a:t>
             </a:fld>
             <a:endParaRPr lang="en-US"/>
           </a:p>
@@ -423,7 +430,7 @@
     </p:spTree>
     <p:extLst>
       <p:ext uri="{BB962C8B-B14F-4D97-AF65-F5344CB8AC3E}">
-        <p14:creationId xmlns:p14="http://schemas.microsoft.com/office/powerpoint/2010/main" val="3119912361"/>
+        <p14:creationId xmlns:p14="http://schemas.microsoft.com/office/powerpoint/2010/main" val="615297395"/>
       </p:ext>
     </p:extLst>
   </p:cSld>
@@ -542,7 +549,7 @@
           <a:p>
             <a:fld id="{955B8CAA-8DD7-4827-A7D8-CBC1AE125B0A}" type="datetimeFigureOut">
               <a:rPr lang="en-US" smtClean="0"/>
-              <a:t>8/30/2021</a:t>
+              <a:t>9/14/2021</a:t>
             </a:fld>
             <a:endParaRPr lang="en-US"/>
           </a:p>
@@ -593,7 +600,7 @@
     </p:spTree>
     <p:extLst>
       <p:ext uri="{BB962C8B-B14F-4D97-AF65-F5344CB8AC3E}">
-        <p14:creationId xmlns:p14="http://schemas.microsoft.com/office/powerpoint/2010/main" val="1322817604"/>
+        <p14:creationId xmlns:p14="http://schemas.microsoft.com/office/powerpoint/2010/main" val="1963416114"/>
       </p:ext>
     </p:extLst>
   </p:cSld>
@@ -635,7 +642,9 @@
             <a:avLst/>
           </a:prstGeom>
           <a:solidFill>
-            <a:schemeClr val="accent2"/>
+            <a:schemeClr val="accent1">
+              <a:lumMod val="75000"/>
+            </a:schemeClr>
           </a:solidFill>
           <a:ln>
             <a:noFill/>
@@ -798,7 +807,7 @@
           <a:p>
             <a:fld id="{955B8CAA-8DD7-4827-A7D8-CBC1AE125B0A}" type="datetimeFigureOut">
               <a:rPr lang="en-US" smtClean="0"/>
-              <a:t>8/30/2021</a:t>
+              <a:t>9/14/2021</a:t>
             </a:fld>
             <a:endParaRPr lang="en-US"/>
           </a:p>
@@ -849,7 +858,7 @@
     </p:spTree>
     <p:extLst>
       <p:ext uri="{BB962C8B-B14F-4D97-AF65-F5344CB8AC3E}">
-        <p14:creationId xmlns:p14="http://schemas.microsoft.com/office/powerpoint/2010/main" val="1200463464"/>
+        <p14:creationId xmlns:p14="http://schemas.microsoft.com/office/powerpoint/2010/main" val="660782912"/>
       </p:ext>
     </p:extLst>
   </p:cSld>
@@ -968,7 +977,7 @@
           <a:p>
             <a:fld id="{955B8CAA-8DD7-4827-A7D8-CBC1AE125B0A}" type="datetimeFigureOut">
               <a:rPr lang="en-US" smtClean="0"/>
-              <a:t>8/30/2021</a:t>
+              <a:t>9/14/2021</a:t>
             </a:fld>
             <a:endParaRPr lang="en-US"/>
           </a:p>
@@ -1019,7 +1028,7 @@
     </p:spTree>
     <p:extLst>
       <p:ext uri="{BB962C8B-B14F-4D97-AF65-F5344CB8AC3E}">
-        <p14:creationId xmlns:p14="http://schemas.microsoft.com/office/powerpoint/2010/main" val="3634784864"/>
+        <p14:creationId xmlns:p14="http://schemas.microsoft.com/office/powerpoint/2010/main" val="4265916961"/>
       </p:ext>
     </p:extLst>
   </p:cSld>
@@ -1032,14 +1041,6 @@
 <file path=ppt/slideLayouts/slideLayout3.xml><?xml version="1.0" encoding="utf-8"?>
 <p:sldLayout xmlns:a="http://schemas.openxmlformats.org/drawingml/2006/main" xmlns:r="http://schemas.openxmlformats.org/officeDocument/2006/relationships" xmlns:p="http://schemas.openxmlformats.org/presentationml/2006/main" showMasterSp="0" type="secHead" preserve="1">
   <p:cSld name="Section Header">
-    <p:bg>
-      <p:bgPr>
-        <a:solidFill>
-          <a:schemeClr val="bg1"/>
-        </a:solidFill>
-        <a:effectLst/>
-      </p:bgPr>
-    </p:bg>
     <p:spTree>
       <p:nvGrpSpPr>
         <p:cNvPr id="1" name=""/>
@@ -1069,7 +1070,9 @@
             <a:avLst/>
           </a:prstGeom>
           <a:solidFill>
-            <a:schemeClr val="accent2"/>
+            <a:schemeClr val="accent1">
+              <a:lumMod val="75000"/>
+            </a:schemeClr>
           </a:solidFill>
           <a:ln>
             <a:noFill/>
@@ -1311,7 +1314,7 @@
           <a:p>
             <a:fld id="{955B8CAA-8DD7-4827-A7D8-CBC1AE125B0A}" type="datetimeFigureOut">
               <a:rPr lang="en-US" smtClean="0"/>
-              <a:t>8/30/2021</a:t>
+              <a:t>9/14/2021</a:t>
             </a:fld>
             <a:endParaRPr lang="en-US"/>
           </a:p>
@@ -1400,7 +1403,7 @@
     </p:spTree>
     <p:extLst>
       <p:ext uri="{BB962C8B-B14F-4D97-AF65-F5344CB8AC3E}">
-        <p14:creationId xmlns:p14="http://schemas.microsoft.com/office/powerpoint/2010/main" val="741924862"/>
+        <p14:creationId xmlns:p14="http://schemas.microsoft.com/office/powerpoint/2010/main" val="1426335223"/>
       </p:ext>
     </p:extLst>
   </p:cSld>
@@ -1468,7 +1471,7 @@
         <p:spPr>
           <a:xfrm>
             <a:off x="1097278" y="1845734"/>
-            <a:ext cx="4937760" cy="4023360"/>
+            <a:ext cx="4937760" cy="4023359"/>
           </a:xfrm>
         </p:spPr>
         <p:txBody>
@@ -1586,7 +1589,7 @@
           <a:p>
             <a:fld id="{955B8CAA-8DD7-4827-A7D8-CBC1AE125B0A}" type="datetimeFigureOut">
               <a:rPr lang="en-US" smtClean="0"/>
-              <a:t>8/30/2021</a:t>
+              <a:t>9/14/2021</a:t>
             </a:fld>
             <a:endParaRPr lang="en-US"/>
           </a:p>
@@ -1637,7 +1640,7 @@
     </p:spTree>
     <p:extLst>
       <p:ext uri="{BB962C8B-B14F-4D97-AF65-F5344CB8AC3E}">
-        <p14:creationId xmlns:p14="http://schemas.microsoft.com/office/powerpoint/2010/main" val="156469002"/>
+        <p14:creationId xmlns:p14="http://schemas.microsoft.com/office/powerpoint/2010/main" val="3414605903"/>
       </p:ext>
     </p:extLst>
   </p:cSld>
@@ -1717,7 +1720,9 @@
               <a:buNone/>
               <a:defRPr sz="2000" b="0" cap="all" baseline="0">
                 <a:solidFill>
-                  <a:schemeClr val="tx2"/>
+                  <a:schemeClr val="tx2">
+                    <a:lumMod val="90000"/>
+                  </a:schemeClr>
                 </a:solidFill>
               </a:defRPr>
             </a:lvl1pPr>
@@ -1845,7 +1850,9 @@
               <a:buNone/>
               <a:defRPr sz="2000" b="0" cap="all" baseline="0">
                 <a:solidFill>
-                  <a:schemeClr val="tx2"/>
+                  <a:schemeClr val="tx2">
+                    <a:lumMod val="90000"/>
+                  </a:schemeClr>
                 </a:solidFill>
               </a:defRPr>
             </a:lvl1pPr>
@@ -1965,7 +1972,7 @@
           <a:p>
             <a:fld id="{955B8CAA-8DD7-4827-A7D8-CBC1AE125B0A}" type="datetimeFigureOut">
               <a:rPr lang="en-US" smtClean="0"/>
-              <a:t>8/30/2021</a:t>
+              <a:t>9/14/2021</a:t>
             </a:fld>
             <a:endParaRPr lang="en-US"/>
           </a:p>
@@ -2016,7 +2023,7 @@
     </p:spTree>
     <p:extLst>
       <p:ext uri="{BB962C8B-B14F-4D97-AF65-F5344CB8AC3E}">
-        <p14:creationId xmlns:p14="http://schemas.microsoft.com/office/powerpoint/2010/main" val="532420197"/>
+        <p14:creationId xmlns:p14="http://schemas.microsoft.com/office/powerpoint/2010/main" val="1499019594"/>
       </p:ext>
     </p:extLst>
   </p:cSld>
@@ -2083,7 +2090,7 @@
           <a:p>
             <a:fld id="{955B8CAA-8DD7-4827-A7D8-CBC1AE125B0A}" type="datetimeFigureOut">
               <a:rPr lang="en-US" smtClean="0"/>
-              <a:t>8/30/2021</a:t>
+              <a:t>9/14/2021</a:t>
             </a:fld>
             <a:endParaRPr lang="en-US"/>
           </a:p>
@@ -2134,7 +2141,7 @@
     </p:spTree>
     <p:extLst>
       <p:ext uri="{BB962C8B-B14F-4D97-AF65-F5344CB8AC3E}">
-        <p14:creationId xmlns:p14="http://schemas.microsoft.com/office/powerpoint/2010/main" val="2757651693"/>
+        <p14:creationId xmlns:p14="http://schemas.microsoft.com/office/powerpoint/2010/main" val="3213124283"/>
       </p:ext>
     </p:extLst>
   </p:cSld>
@@ -2176,7 +2183,9 @@
             <a:avLst/>
           </a:prstGeom>
           <a:solidFill>
-            <a:schemeClr val="accent2"/>
+            <a:schemeClr val="accent1">
+              <a:lumMod val="75000"/>
+            </a:schemeClr>
           </a:solidFill>
           <a:ln>
             <a:noFill/>
@@ -2254,7 +2263,7 @@
           <a:p>
             <a:fld id="{955B8CAA-8DD7-4827-A7D8-CBC1AE125B0A}" type="datetimeFigureOut">
               <a:rPr lang="en-US" smtClean="0"/>
-              <a:t>8/30/2021</a:t>
+              <a:t>9/14/2021</a:t>
             </a:fld>
             <a:endParaRPr lang="en-US"/>
           </a:p>
@@ -2313,7 +2322,7 @@
     </p:spTree>
     <p:extLst>
       <p:ext uri="{BB962C8B-B14F-4D97-AF65-F5344CB8AC3E}">
-        <p14:creationId xmlns:p14="http://schemas.microsoft.com/office/powerpoint/2010/main" val="1600631169"/>
+        <p14:creationId xmlns:p14="http://schemas.microsoft.com/office/powerpoint/2010/main" val="3510519278"/>
       </p:ext>
     </p:extLst>
   </p:cSld>
@@ -2348,14 +2357,16 @@
         </p:nvSpPr>
         <p:spPr>
           <a:xfrm>
-            <a:off x="16" y="0"/>
+            <a:off x="0" y="0"/>
             <a:ext cx="4050791" cy="6858000"/>
           </a:xfrm>
           <a:prstGeom prst="rect">
             <a:avLst/>
           </a:prstGeom>
           <a:solidFill>
-            <a:schemeClr val="accent2"/>
+            <a:schemeClr val="accent1">
+              <a:lumMod val="75000"/>
+            </a:schemeClr>
           </a:solidFill>
           <a:ln>
             <a:noFill/>
@@ -2608,7 +2619,7 @@
           <a:p>
             <a:fld id="{955B8CAA-8DD7-4827-A7D8-CBC1AE125B0A}" type="datetimeFigureOut">
               <a:rPr lang="en-US" smtClean="0"/>
-              <a:t>8/30/2021</a:t>
+              <a:t>9/14/2021</a:t>
             </a:fld>
             <a:endParaRPr lang="en-US"/>
           </a:p>
@@ -2680,7 +2691,7 @@
     </p:spTree>
     <p:extLst>
       <p:ext uri="{BB962C8B-B14F-4D97-AF65-F5344CB8AC3E}">
-        <p14:creationId xmlns:p14="http://schemas.microsoft.com/office/powerpoint/2010/main" val="4035921664"/>
+        <p14:creationId xmlns:p14="http://schemas.microsoft.com/office/powerpoint/2010/main" val="1592482966"/>
       </p:ext>
     </p:extLst>
   </p:cSld>
@@ -2707,44 +2718,6 @@
           <a:chExt cx="0" cy="0"/>
         </a:xfrm>
       </p:grpSpPr>
-      <p:sp>
-        <p:nvSpPr>
-          <p:cNvPr id="8" name="Rectangle 7"/>
-          <p:cNvSpPr/>
-          <p:nvPr/>
-        </p:nvSpPr>
-        <p:spPr>
-          <a:xfrm>
-            <a:off x="0" y="4953000"/>
-            <a:ext cx="12188825" cy="1905000"/>
-          </a:xfrm>
-          <a:prstGeom prst="rect">
-            <a:avLst/>
-          </a:prstGeom>
-          <a:solidFill>
-            <a:schemeClr val="accent2"/>
-          </a:solidFill>
-          <a:ln>
-            <a:noFill/>
-          </a:ln>
-        </p:spPr>
-        <p:style>
-          <a:lnRef idx="2">
-            <a:schemeClr val="accent1">
-              <a:shade val="50000"/>
-            </a:schemeClr>
-          </a:lnRef>
-          <a:fillRef idx="1">
-            <a:schemeClr val="accent1"/>
-          </a:fillRef>
-          <a:effectRef idx="0">
-            <a:schemeClr val="accent1"/>
-          </a:effectRef>
-          <a:fontRef idx="minor">
-            <a:schemeClr val="lt1"/>
-          </a:fontRef>
-        </p:style>
-      </p:sp>
       <p:sp>
         <p:nvSpPr>
           <p:cNvPr id="9" name="Rectangle 8"/>
@@ -2800,14 +2773,14 @@
           </a:xfrm>
         </p:spPr>
         <p:txBody>
-          <a:bodyPr lIns="91440" tIns="0" rIns="91440" bIns="0" anchor="b">
+          <a:bodyPr tIns="0" bIns="0" anchor="b">
             <a:noAutofit/>
           </a:bodyPr>
           <a:lstStyle>
             <a:lvl1pPr>
               <a:defRPr sz="3600" b="0">
                 <a:solidFill>
-                  <a:srgbClr val="FFFFFF"/>
+                  <a:schemeClr val="tx1"/>
                 </a:solidFill>
               </a:defRPr>
             </a:lvl1pPr>
@@ -2837,8 +2810,9 @@
             <a:ext cx="12191985" cy="4915076"/>
           </a:xfrm>
           <a:solidFill>
-            <a:schemeClr val="bg2">
-              <a:lumMod val="90000"/>
+            <a:schemeClr val="bg1">
+              <a:lumMod val="50000"/>
+              <a:lumOff val="50000"/>
             </a:schemeClr>
           </a:solidFill>
         </p:spPr>
@@ -2922,7 +2896,7 @@
               <a:buNone/>
               <a:defRPr sz="1500">
                 <a:solidFill>
-                  <a:srgbClr val="FFFFFF"/>
+                  <a:schemeClr val="tx1"/>
                 </a:solidFill>
               </a:defRPr>
             </a:lvl1pPr>
@@ -2981,11 +2955,19 @@
         <p:spPr/>
         <p:txBody>
           <a:bodyPr/>
-          <a:lstStyle/>
+          <a:lstStyle>
+            <a:lvl1pPr>
+              <a:defRPr>
+                <a:solidFill>
+                  <a:schemeClr val="tx2"/>
+                </a:solidFill>
+              </a:defRPr>
+            </a:lvl1pPr>
+          </a:lstStyle>
           <a:p>
             <a:fld id="{955B8CAA-8DD7-4827-A7D8-CBC1AE125B0A}" type="datetimeFigureOut">
               <a:rPr lang="en-US" smtClean="0"/>
-              <a:t>8/30/2021</a:t>
+              <a:t>9/14/2021</a:t>
             </a:fld>
             <a:endParaRPr lang="en-US"/>
           </a:p>
@@ -3004,7 +2986,15 @@
         <p:spPr/>
         <p:txBody>
           <a:bodyPr/>
-          <a:lstStyle/>
+          <a:lstStyle>
+            <a:lvl1pPr>
+              <a:defRPr>
+                <a:solidFill>
+                  <a:schemeClr val="tx2"/>
+                </a:solidFill>
+              </a:defRPr>
+            </a:lvl1pPr>
+          </a:lstStyle>
           <a:p>
             <a:endParaRPr lang="en-US"/>
           </a:p>
@@ -3023,7 +3013,15 @@
         <p:spPr/>
         <p:txBody>
           <a:bodyPr/>
-          <a:lstStyle/>
+          <a:lstStyle>
+            <a:lvl1pPr>
+              <a:defRPr>
+                <a:solidFill>
+                  <a:schemeClr val="tx2"/>
+                </a:solidFill>
+              </a:defRPr>
+            </a:lvl1pPr>
+          </a:lstStyle>
           <a:p>
             <a:fld id="{D51B3B86-498D-45D5-BEB4-E80AF31126FC}" type="slidenum">
               <a:rPr lang="en-US" smtClean="0"/>
@@ -3036,7 +3034,7 @@
     </p:spTree>
     <p:extLst>
       <p:ext uri="{BB962C8B-B14F-4D97-AF65-F5344CB8AC3E}">
-        <p14:creationId xmlns:p14="http://schemas.microsoft.com/office/powerpoint/2010/main" val="3989407075"/>
+        <p14:creationId xmlns:p14="http://schemas.microsoft.com/office/powerpoint/2010/main" val="644588871"/>
       </p:ext>
     </p:extLst>
   </p:cSld>
@@ -3050,9 +3048,15 @@
 <p:sldMaster xmlns:a="http://schemas.openxmlformats.org/drawingml/2006/main" xmlns:r="http://schemas.openxmlformats.org/officeDocument/2006/relationships" xmlns:p="http://schemas.openxmlformats.org/presentationml/2006/main">
   <p:cSld>
     <p:bg>
-      <p:bgRef idx="1001">
-        <a:schemeClr val="bg1"/>
-      </p:bgRef>
+      <p:bgPr>
+        <a:solidFill>
+          <a:schemeClr val="bg1">
+            <a:lumMod val="75000"/>
+            <a:lumOff val="25000"/>
+          </a:schemeClr>
+        </a:solidFill>
+        <a:effectLst/>
+      </p:bgPr>
     </p:bg>
     <p:spTree>
       <p:nvGrpSpPr>
@@ -3083,7 +3087,9 @@
             <a:avLst/>
           </a:prstGeom>
           <a:solidFill>
-            <a:schemeClr val="accent2"/>
+            <a:schemeClr val="accent1">
+              <a:lumMod val="75000"/>
+            </a:schemeClr>
           </a:solidFill>
           <a:ln>
             <a:noFill/>
@@ -3114,8 +3120,8 @@
         </p:nvSpPr>
         <p:spPr>
           <a:xfrm>
-            <a:off x="15" y="6334316"/>
-            <a:ext cx="12191985" cy="66484"/>
+            <a:off x="1" y="6334316"/>
+            <a:ext cx="12192000" cy="66484"/>
           </a:xfrm>
           <a:prstGeom prst="rect">
             <a:avLst/>
@@ -3272,7 +3278,7 @@
           <a:p>
             <a:fld id="{955B8CAA-8DD7-4827-A7D8-CBC1AE125B0A}" type="datetimeFigureOut">
               <a:rPr lang="en-US" smtClean="0"/>
-              <a:t>8/30/2021</a:t>
+              <a:t>9/14/2021</a:t>
             </a:fld>
             <a:endParaRPr lang="en-US"/>
           </a:p>
@@ -3393,23 +3399,23 @@
     </p:spTree>
     <p:extLst>
       <p:ext uri="{BB962C8B-B14F-4D97-AF65-F5344CB8AC3E}">
-        <p14:creationId xmlns:p14="http://schemas.microsoft.com/office/powerpoint/2010/main" val="1064274663"/>
+        <p14:creationId xmlns:p14="http://schemas.microsoft.com/office/powerpoint/2010/main" val="441873090"/>
       </p:ext>
     </p:extLst>
   </p:cSld>
-  <p:clrMap bg1="lt1" tx1="dk1" bg2="lt2" tx2="dk2" accent1="accent1" accent2="accent2" accent3="accent3" accent4="accent4" accent5="accent5" accent6="accent6" hlink="hlink" folHlink="folHlink"/>
+  <p:clrMap bg1="dk1" tx1="lt1" bg2="dk2" tx2="lt2" accent1="accent1" accent2="accent2" accent3="accent3" accent4="accent4" accent5="accent5" accent6="accent6" hlink="hlink" folHlink="folHlink"/>
   <p:sldLayoutIdLst>
-    <p:sldLayoutId id="2147483673" r:id="rId1"/>
-    <p:sldLayoutId id="2147483674" r:id="rId2"/>
-    <p:sldLayoutId id="2147483675" r:id="rId3"/>
-    <p:sldLayoutId id="2147483676" r:id="rId4"/>
-    <p:sldLayoutId id="2147483677" r:id="rId5"/>
-    <p:sldLayoutId id="2147483678" r:id="rId6"/>
-    <p:sldLayoutId id="2147483679" r:id="rId7"/>
-    <p:sldLayoutId id="2147483680" r:id="rId8"/>
-    <p:sldLayoutId id="2147483681" r:id="rId9"/>
-    <p:sldLayoutId id="2147483682" r:id="rId10"/>
-    <p:sldLayoutId id="2147483683" r:id="rId11"/>
+    <p:sldLayoutId id="2147483685" r:id="rId1"/>
+    <p:sldLayoutId id="2147483686" r:id="rId2"/>
+    <p:sldLayoutId id="2147483687" r:id="rId3"/>
+    <p:sldLayoutId id="2147483688" r:id="rId4"/>
+    <p:sldLayoutId id="2147483689" r:id="rId5"/>
+    <p:sldLayoutId id="2147483690" r:id="rId6"/>
+    <p:sldLayoutId id="2147483691" r:id="rId7"/>
+    <p:sldLayoutId id="2147483692" r:id="rId8"/>
+    <p:sldLayoutId id="2147483693" r:id="rId9"/>
+    <p:sldLayoutId id="2147483694" r:id="rId10"/>
+    <p:sldLayoutId id="2147483695" r:id="rId11"/>
   </p:sldLayoutIdLst>
   <p:txStyles>
     <p:titleStyle>
@@ -3446,7 +3452,7 @@
           <a:spcPts val="200"/>
         </a:spcAft>
         <a:buClr>
-          <a:schemeClr val="accent1"/>
+          <a:schemeClr val="accent3"/>
         </a:buClr>
         <a:buSzPct val="100000"/>
         <a:buFont typeface="Calibri" panose="020F0502020204030204" pitchFamily="34" charset="0"/>
@@ -3474,7 +3480,7 @@
           <a:spcPts val="400"/>
         </a:spcAft>
         <a:buClr>
-          <a:schemeClr val="accent1"/>
+          <a:schemeClr val="accent3"/>
         </a:buClr>
         <a:buFont typeface="Calibri" pitchFamily="34" charset="0"/>
         <a:buChar char="◦"/>
@@ -3501,7 +3507,7 @@
           <a:spcPts val="400"/>
         </a:spcAft>
         <a:buClr>
-          <a:schemeClr val="accent1"/>
+          <a:schemeClr val="accent3"/>
         </a:buClr>
         <a:buFont typeface="Calibri" pitchFamily="34" charset="0"/>
         <a:buChar char="◦"/>
@@ -3528,7 +3534,7 @@
           <a:spcPts val="400"/>
         </a:spcAft>
         <a:buClr>
-          <a:schemeClr val="accent1"/>
+          <a:schemeClr val="accent3"/>
         </a:buClr>
         <a:buFont typeface="Calibri" pitchFamily="34" charset="0"/>
         <a:buChar char="◦"/>
@@ -3555,7 +3561,7 @@
           <a:spcPts val="400"/>
         </a:spcAft>
         <a:buClr>
-          <a:schemeClr val="accent1"/>
+          <a:schemeClr val="accent3"/>
         </a:buClr>
         <a:buFont typeface="Calibri" pitchFamily="34" charset="0"/>
         <a:buChar char="◦"/>
@@ -3582,7 +3588,7 @@
           <a:spcPts val="400"/>
         </a:spcAft>
         <a:buClr>
-          <a:schemeClr val="accent1"/>
+          <a:schemeClr val="accent3"/>
         </a:buClr>
         <a:buFont typeface="Calibri" pitchFamily="34" charset="0"/>
         <a:buChar char="◦"/>
@@ -3609,7 +3615,7 @@
           <a:spcPts val="400"/>
         </a:spcAft>
         <a:buClr>
-          <a:schemeClr val="accent1"/>
+          <a:schemeClr val="accent3"/>
         </a:buClr>
         <a:buFont typeface="Calibri" pitchFamily="34" charset="0"/>
         <a:buChar char="◦"/>
@@ -3636,7 +3642,7 @@
           <a:spcPts val="400"/>
         </a:spcAft>
         <a:buClr>
-          <a:schemeClr val="accent1"/>
+          <a:schemeClr val="accent3"/>
         </a:buClr>
         <a:buFont typeface="Calibri" pitchFamily="34" charset="0"/>
         <a:buChar char="◦"/>
@@ -3663,7 +3669,7 @@
           <a:spcPts val="400"/>
         </a:spcAft>
         <a:buClr>
-          <a:schemeClr val="accent1"/>
+          <a:schemeClr val="accent3"/>
         </a:buClr>
         <a:buFont typeface="Calibri" pitchFamily="34" charset="0"/>
         <a:buChar char="◦"/>
@@ -3881,19 +3887,17 @@
             <p:ph type="ctrTitle"/>
           </p:nvPr>
         </p:nvSpPr>
-        <p:spPr>
-          <a:xfrm>
-            <a:off x="1097280" y="758952"/>
-            <a:ext cx="10058400" cy="3566160"/>
-          </a:xfrm>
-        </p:spPr>
+        <p:spPr/>
         <p:txBody>
           <a:bodyPr>
             <a:normAutofit/>
           </a:bodyPr>
           <a:lstStyle/>
           <a:p>
-            <a:endParaRPr lang="en-US"/>
+            <a:r>
+              <a:rPr lang="en-US" dirty="0"/>
+              <a:t>What is REST?</a:t>
+            </a:r>
           </a:p>
         </p:txBody>
       </p:sp>
@@ -3913,19 +3917,37 @@
             <p:ph type="subTitle" idx="1"/>
           </p:nvPr>
         </p:nvSpPr>
-        <p:spPr>
-          <a:xfrm>
-            <a:off x="1100051" y="4455621"/>
-            <a:ext cx="10058400" cy="1143000"/>
-          </a:xfrm>
-        </p:spPr>
+        <p:spPr/>
         <p:txBody>
           <a:bodyPr>
             <a:normAutofit/>
           </a:bodyPr>
           <a:lstStyle/>
           <a:p>
-            <a:endParaRPr lang="en-US"/>
+            <a:r>
+              <a:rPr lang="en-US" b="0" i="0" dirty="0">
+                <a:solidFill>
+                  <a:srgbClr val="FFFFFF"/>
+                </a:solidFill>
+                <a:effectLst/>
+                <a:latin typeface="Roboto" panose="02000000000000000000" pitchFamily="2" charset="0"/>
+              </a:rPr>
+              <a:t>Learn to Produce Effective</a:t>
+            </a:r>
+            <a:br>
+              <a:rPr lang="en-US" dirty="0"/>
+            </a:br>
+            <a:r>
+              <a:rPr lang="en-US" b="0" i="0" dirty="0">
+                <a:solidFill>
+                  <a:srgbClr val="FFFFFF"/>
+                </a:solidFill>
+                <a:effectLst/>
+                <a:latin typeface="Roboto" panose="02000000000000000000" pitchFamily="2" charset="0"/>
+              </a:rPr>
+              <a:t>Web APIs with ASP.NET 5</a:t>
+            </a:r>
+            <a:endParaRPr lang="en-US" dirty="0"/>
           </a:p>
         </p:txBody>
       </p:sp>
@@ -4033,34 +4055,34 @@
         <a:sysClr val="window" lastClr="FFFFFF"/>
       </a:lt1>
       <a:dk2>
-        <a:srgbClr val="455F51"/>
+        <a:srgbClr val="564B3C"/>
       </a:dk2>
       <a:lt2>
-        <a:srgbClr val="E2DFCC"/>
+        <a:srgbClr val="ECEDD1"/>
       </a:lt2>
       <a:accent1>
-        <a:srgbClr val="99CB38"/>
+        <a:srgbClr val="93A299"/>
       </a:accent1>
       <a:accent2>
-        <a:srgbClr val="63A537"/>
+        <a:srgbClr val="CF543F"/>
       </a:accent2>
       <a:accent3>
-        <a:srgbClr val="37A76F"/>
+        <a:srgbClr val="B5AE53"/>
       </a:accent3>
       <a:accent4>
-        <a:srgbClr val="44C1A3"/>
+        <a:srgbClr val="848058"/>
       </a:accent4>
       <a:accent5>
-        <a:srgbClr val="4EB3CF"/>
+        <a:srgbClr val="E8B54D"/>
       </a:accent5>
       <a:accent6>
-        <a:srgbClr val="51C3F9"/>
+        <a:srgbClr val="786C71"/>
       </a:accent6>
       <a:hlink>
-        <a:srgbClr val="6B9F25"/>
+        <a:srgbClr val="CCCC00"/>
       </a:hlink>
       <a:folHlink>
-        <a:srgbClr val="B26B02"/>
+        <a:srgbClr val="B2B2B2"/>
       </a:folHlink>
     </a:clrScheme>
     <a:fontScheme name="Retrospect">
@@ -4299,7 +4321,7 @@
   <a:extraClrSchemeLst/>
   <a:extLst>
     <a:ext uri="{05A4C25C-085E-4340-85A3-A5531E510DB2}">
-      <thm15:themeFamily xmlns:thm15="http://schemas.microsoft.com/office/thememl/2012/main" name="Retrospect" id="{5F128B03-DCCA-4EEB-AB3B-CF2899314A46}" vid="{D26EA377-59BD-4C9C-9D94-EE8416EE4C79}"/>
+      <thm15:themeFamily xmlns:thm15="http://schemas.microsoft.com/office/thememl/2012/main" name="Retrospect" id="{5F128B03-DCCA-4EEB-AB3B-CF2899314A46}" vid="{E3DA18C2-75F1-4980-A5F0-165F6F71DE6D}"/>
     </a:ext>
   </a:extLst>
 </a:theme>

</xml_diff>